<commit_message>
most recent minimum viable product presentation
</commit_message>
<xml_diff>
--- a/doc/presentations/SW Engineering_ Minimum Viable Product Presentation.pptx
+++ b/doc/presentations/SW Engineering_ Minimum Viable Product Presentation.pptx
@@ -6770,18 +6770,18 @@
         </p:spPr>
         <p:txBody>
           <a:bodyPr anchorCtr="0" anchor="t" bIns="91425" lIns="91425" spcFirstLastPara="1" rIns="91425" wrap="square" tIns="91425">
-            <a:normAutofit fontScale="85000" lnSpcReduction="20000"/>
+            <a:normAutofit lnSpcReduction="10000"/>
           </a:bodyPr>
           <a:lstStyle/>
           <a:p>
-            <a:pPr indent="-325755" lvl="0" marL="457200" rtl="0" algn="l">
-              <a:spcBef>
-                <a:spcPts val="0"/>
-              </a:spcBef>
-              <a:spcAft>
-                <a:spcPts val="0"/>
-              </a:spcAft>
-              <a:buSzPct val="100000"/>
+            <a:pPr indent="-342900" lvl="0" marL="457200" rtl="0" algn="l">
+              <a:spcBef>
+                <a:spcPts val="0"/>
+              </a:spcBef>
+              <a:spcAft>
+                <a:spcPts val="0"/>
+              </a:spcAft>
+              <a:buSzPts val="1800"/>
               <a:buChar char="●"/>
             </a:pPr>
             <a:r>
@@ -6806,14 +6806,14 @@
             <a:endParaRPr/>
           </a:p>
           <a:p>
-            <a:pPr indent="-325755" lvl="0" marL="457200" rtl="0" algn="l">
+            <a:pPr indent="-342900" lvl="0" marL="457200" rtl="0" algn="l">
               <a:spcBef>
                 <a:spcPts val="1200"/>
               </a:spcBef>
               <a:spcAft>
                 <a:spcPts val="0"/>
               </a:spcAft>
-              <a:buSzPct val="100000"/>
+              <a:buSzPts val="1800"/>
               <a:buChar char="●"/>
             </a:pPr>
             <a:r>
@@ -6838,14 +6838,14 @@
             <a:endParaRPr/>
           </a:p>
           <a:p>
-            <a:pPr indent="-325755" lvl="0" marL="457200" rtl="0" algn="l">
+            <a:pPr indent="-342900" lvl="0" marL="457200" rtl="0" algn="l">
               <a:spcBef>
                 <a:spcPts val="1200"/>
               </a:spcBef>
               <a:spcAft>
                 <a:spcPts val="0"/>
               </a:spcAft>
-              <a:buSzPct val="100000"/>
+              <a:buSzPts val="1800"/>
               <a:buChar char="●"/>
             </a:pPr>
             <a:r>
@@ -6870,51 +6870,36 @@
             <a:endParaRPr/>
           </a:p>
           <a:p>
-            <a:pPr indent="-325755" lvl="0" marL="457200" rtl="0" algn="l">
+            <a:pPr indent="-342900" lvl="0" marL="457200" rtl="0" algn="l">
               <a:spcBef>
                 <a:spcPts val="1200"/>
               </a:spcBef>
               <a:spcAft>
                 <a:spcPts val="0"/>
               </a:spcAft>
-              <a:buSzPct val="100000"/>
+              <a:buSzPts val="1800"/>
               <a:buChar char="●"/>
             </a:pPr>
             <a:r>
               <a:rPr lang="en"/>
-              <a:t>Any road blocks?</a:t>
+              <a:t>Planning to do what by next update?</a:t>
             </a:r>
             <a:endParaRPr/>
           </a:p>
           <a:p>
-            <a:pPr indent="0" lvl="0" marL="457200" rtl="0" algn="l">
-              <a:spcBef>
-                <a:spcPts val="1200"/>
-              </a:spcBef>
-              <a:spcAft>
-                <a:spcPts val="0"/>
-              </a:spcAft>
-              <a:buNone/>
+            <a:pPr indent="-317500" lvl="1" marL="914400" rtl="0" algn="l">
+              <a:spcBef>
+                <a:spcPts val="0"/>
+              </a:spcBef>
+              <a:spcAft>
+                <a:spcPts val="0"/>
+              </a:spcAft>
+              <a:buSzPts val="1400"/>
+              <a:buChar char="○"/>
             </a:pPr>
             <a:r>
-              <a:t/>
-            </a:r>
-            <a:endParaRPr/>
-          </a:p>
-          <a:p>
-            <a:pPr indent="-325755" lvl="0" marL="457200" rtl="0" algn="l">
-              <a:spcBef>
-                <a:spcPts val="1200"/>
-              </a:spcBef>
-              <a:spcAft>
-                <a:spcPts val="0"/>
-              </a:spcAft>
-              <a:buSzPct val="100000"/>
-              <a:buChar char="●"/>
-            </a:pPr>
-            <a:r>
-              <a:rPr lang="en"/>
-              <a:t>Offer proof of feature completion</a:t>
+              <a:rPr lang="en" sz="1800"/>
+              <a:t>Any expected road blocks?</a:t>
             </a:r>
             <a:endParaRPr/>
           </a:p>

</xml_diff>

<commit_message>
Revert "most recent minimum viable product presentation"
This reverts commit e68ccdb4bcdf967b8604f06a640f19ec2a68cd78.
</commit_message>
<xml_diff>
--- a/doc/presentations/SW Engineering_ Minimum Viable Product Presentation.pptx
+++ b/doc/presentations/SW Engineering_ Minimum Viable Product Presentation.pptx
@@ -6770,18 +6770,18 @@
         </p:spPr>
         <p:txBody>
           <a:bodyPr anchorCtr="0" anchor="t" bIns="91425" lIns="91425" spcFirstLastPara="1" rIns="91425" wrap="square" tIns="91425">
-            <a:normAutofit lnSpcReduction="10000"/>
+            <a:normAutofit fontScale="85000" lnSpcReduction="20000"/>
           </a:bodyPr>
           <a:lstStyle/>
           <a:p>
-            <a:pPr indent="-342900" lvl="0" marL="457200" rtl="0" algn="l">
-              <a:spcBef>
-                <a:spcPts val="0"/>
-              </a:spcBef>
-              <a:spcAft>
-                <a:spcPts val="0"/>
-              </a:spcAft>
-              <a:buSzPts val="1800"/>
+            <a:pPr indent="-325755" lvl="0" marL="457200" rtl="0" algn="l">
+              <a:spcBef>
+                <a:spcPts val="0"/>
+              </a:spcBef>
+              <a:spcAft>
+                <a:spcPts val="0"/>
+              </a:spcAft>
+              <a:buSzPct val="100000"/>
               <a:buChar char="●"/>
             </a:pPr>
             <a:r>
@@ -6806,14 +6806,14 @@
             <a:endParaRPr/>
           </a:p>
           <a:p>
-            <a:pPr indent="-342900" lvl="0" marL="457200" rtl="0" algn="l">
+            <a:pPr indent="-325755" lvl="0" marL="457200" rtl="0" algn="l">
               <a:spcBef>
                 <a:spcPts val="1200"/>
               </a:spcBef>
               <a:spcAft>
                 <a:spcPts val="0"/>
               </a:spcAft>
-              <a:buSzPts val="1800"/>
+              <a:buSzPct val="100000"/>
               <a:buChar char="●"/>
             </a:pPr>
             <a:r>
@@ -6838,14 +6838,14 @@
             <a:endParaRPr/>
           </a:p>
           <a:p>
-            <a:pPr indent="-342900" lvl="0" marL="457200" rtl="0" algn="l">
+            <a:pPr indent="-325755" lvl="0" marL="457200" rtl="0" algn="l">
               <a:spcBef>
                 <a:spcPts val="1200"/>
               </a:spcBef>
               <a:spcAft>
                 <a:spcPts val="0"/>
               </a:spcAft>
-              <a:buSzPts val="1800"/>
+              <a:buSzPct val="100000"/>
               <a:buChar char="●"/>
             </a:pPr>
             <a:r>
@@ -6870,36 +6870,51 @@
             <a:endParaRPr/>
           </a:p>
           <a:p>
-            <a:pPr indent="-342900" lvl="0" marL="457200" rtl="0" algn="l">
+            <a:pPr indent="-325755" lvl="0" marL="457200" rtl="0" algn="l">
               <a:spcBef>
                 <a:spcPts val="1200"/>
               </a:spcBef>
               <a:spcAft>
                 <a:spcPts val="0"/>
               </a:spcAft>
-              <a:buSzPts val="1800"/>
+              <a:buSzPct val="100000"/>
               <a:buChar char="●"/>
             </a:pPr>
             <a:r>
               <a:rPr lang="en"/>
-              <a:t>Planning to do what by next update?</a:t>
+              <a:t>Any road blocks?</a:t>
             </a:r>
             <a:endParaRPr/>
           </a:p>
           <a:p>
-            <a:pPr indent="-317500" lvl="1" marL="914400" rtl="0" algn="l">
-              <a:spcBef>
-                <a:spcPts val="0"/>
-              </a:spcBef>
-              <a:spcAft>
-                <a:spcPts val="0"/>
-              </a:spcAft>
-              <a:buSzPts val="1400"/>
-              <a:buChar char="○"/>
+            <a:pPr indent="0" lvl="0" marL="457200" rtl="0" algn="l">
+              <a:spcBef>
+                <a:spcPts val="1200"/>
+              </a:spcBef>
+              <a:spcAft>
+                <a:spcPts val="0"/>
+              </a:spcAft>
+              <a:buNone/>
             </a:pPr>
             <a:r>
-              <a:rPr lang="en" sz="1800"/>
-              <a:t>Any expected road blocks?</a:t>
+              <a:t/>
+            </a:r>
+            <a:endParaRPr/>
+          </a:p>
+          <a:p>
+            <a:pPr indent="-325755" lvl="0" marL="457200" rtl="0" algn="l">
+              <a:spcBef>
+                <a:spcPts val="1200"/>
+              </a:spcBef>
+              <a:spcAft>
+                <a:spcPts val="0"/>
+              </a:spcAft>
+              <a:buSzPct val="100000"/>
+              <a:buChar char="●"/>
+            </a:pPr>
+            <a:r>
+              <a:rPr lang="en"/>
+              <a:t>Offer proof of feature completion</a:t>
             </a:r>
             <a:endParaRPr/>
           </a:p>

</xml_diff>